<commit_message>
Added Presentation and text
</commit_message>
<xml_diff>
--- a/Projekt/Netzwerk/Netzwerktypen.pptx
+++ b/Projekt/Netzwerk/Netzwerktypen.pptx
@@ -7,6 +7,7 @@
   <p:sldIdLst>
     <p:sldId id="256" r:id="rId2"/>
     <p:sldId id="257" r:id="rId3"/>
+    <p:sldId id="258" r:id="rId4"/>
   </p:sldIdLst>
   <p:sldSz cx="9144000" cy="6858000" type="screen4x3"/>
   <p:notesSz cx="6858000" cy="9144000"/>
@@ -3117,35 +3118,31 @@
           <a:lstStyle/>
           <a:p>
             <a:r>
+              <a:rPr lang="de-DE" dirty="0" smtClean="0"/>
+              <a:t>Netzwerktypen</a:t>
+            </a:r>
+            <a:endParaRPr lang="de-DE" dirty="0"/>
+          </a:p>
+        </p:txBody>
+      </p:sp>
+      <p:sp>
+        <p:nvSpPr>
+          <p:cNvPr id="3" name="Subtitle 2"/>
+          <p:cNvSpPr>
+            <a:spLocks noGrp="1"/>
+          </p:cNvSpPr>
+          <p:nvPr>
+            <p:ph type="subTitle" idx="1"/>
+          </p:nvPr>
+        </p:nvSpPr>
+        <p:spPr/>
+        <p:txBody>
+          <a:bodyPr/>
+          <a:lstStyle/>
+          <a:p>
+            <a:r>
               <a:rPr lang="en-US" dirty="0" smtClean="0"/>
-              <a:t>1000 BASE SX/LX &amp; 10G BASE SX/LX</a:t>
-            </a:r>
-            <a:endParaRPr lang="en-US" dirty="0"/>
-          </a:p>
-        </p:txBody>
-      </p:sp>
-      <p:sp>
-        <p:nvSpPr>
-          <p:cNvPr id="3" name="Subtitle 2"/>
-          <p:cNvSpPr>
-            <a:spLocks noGrp="1"/>
-          </p:cNvSpPr>
-          <p:nvPr>
-            <p:ph type="subTitle" idx="1"/>
-          </p:nvPr>
-        </p:nvSpPr>
-        <p:spPr/>
-        <p:txBody>
-          <a:bodyPr/>
-          <a:lstStyle/>
-          <a:p>
-            <a:r>
-              <a:rPr lang="en-US" dirty="0" err="1" smtClean="0"/>
-              <a:t>oder</a:t>
-            </a:r>
-            <a:r>
-              <a:rPr lang="en-US" dirty="0" smtClean="0"/>
-              <a:t> WAS?</a:t>
+              <a:t>Oder 10GBASE-SX</a:t>
             </a:r>
           </a:p>
         </p:txBody>
@@ -3160,6 +3157,25 @@
   <p:clrMapOvr>
     <a:masterClrMapping/>
   </p:clrMapOvr>
+  <mc:AlternateContent xmlns:mc="http://schemas.openxmlformats.org/markup-compatibility/2006">
+    <mc:Choice xmlns:p14="http://schemas.microsoft.com/office/powerpoint/2010/main" Requires="p14">
+      <p:transition spd="slow" p14:dur="1300">
+        <p14:pan dir="u"/>
+      </p:transition>
+    </mc:Choice>
+    <mc:Fallback>
+      <p:transition xmlns:p14="http://schemas.microsoft.com/office/powerpoint/2010/main" spd="slow">
+        <p:fade/>
+      </p:transition>
+    </mc:Fallback>
+  </mc:AlternateContent>
+  <p:timing>
+    <p:tnLst>
+      <p:par>
+        <p:cTn xmlns:p14="http://schemas.microsoft.com/office/powerpoint/2010/main" id="1" dur="indefinite" restart="never" nodeType="tmRoot"/>
+      </p:par>
+    </p:tnLst>
+  </p:timing>
 </p:sld>
 </file>
 
@@ -3192,36 +3208,729 @@
         </p:nvSpPr>
         <p:spPr/>
         <p:txBody>
-          <a:bodyPr/>
-          <a:lstStyle/>
-          <a:p>
-            <a:endParaRPr lang="en-US" dirty="0"/>
-          </a:p>
-        </p:txBody>
-      </p:sp>
-      <p:sp>
-        <p:nvSpPr>
-          <p:cNvPr id="3" name="Content Placeholder 2"/>
-          <p:cNvSpPr>
-            <a:spLocks noGrp="1"/>
-          </p:cNvSpPr>
+          <a:bodyPr>
+            <a:normAutofit/>
+          </a:bodyPr>
+          <a:lstStyle/>
+          <a:p>
+            <a:r>
+              <a:rPr lang="de-DE" dirty="0" smtClean="0"/>
+              <a:t>Nomenklatur der Standards</a:t>
+            </a:r>
+            <a:endParaRPr lang="de-DE" dirty="0"/>
+          </a:p>
+        </p:txBody>
+      </p:sp>
+      <p:pic>
+        <p:nvPicPr>
+          <p:cNvPr id="4" name="Content Placeholder 3" descr="Screen Shot 2013-04-08 at 12.54.09.png"/>
+          <p:cNvPicPr>
+            <a:picLocks noGrp="1" noChangeAspect="1"/>
+          </p:cNvPicPr>
           <p:nvPr>
             <p:ph idx="1"/>
           </p:nvPr>
-        </p:nvSpPr>
+        </p:nvPicPr>
+        <p:blipFill>
+          <a:blip r:embed="rId2">
+            <a:extLst>
+              <a:ext uri="{28A0092B-C50C-407E-A947-70E740481C1C}">
+                <a14:useLocalDpi xmlns:a14="http://schemas.microsoft.com/office/drawing/2010/main" val="0"/>
+              </a:ext>
+            </a:extLst>
+          </a:blip>
+          <a:srcRect l="-3969" r="-3969"/>
+          <a:stretch>
+            <a:fillRect/>
+          </a:stretch>
+        </p:blipFill>
         <p:spPr/>
-        <p:txBody>
-          <a:bodyPr/>
-          <a:lstStyle/>
-          <a:p>
-            <a:endParaRPr lang="en-US" dirty="0"/>
-          </a:p>
-        </p:txBody>
-      </p:sp>
+      </p:pic>
     </p:spTree>
     <p:extLst>
       <p:ext uri="{BB962C8B-B14F-4D97-AF65-F5344CB8AC3E}">
         <p14:creationId xmlns:p14="http://schemas.microsoft.com/office/powerpoint/2010/main" val="2219532481"/>
+      </p:ext>
+    </p:extLst>
+  </p:cSld>
+  <p:clrMapOvr>
+    <a:masterClrMapping/>
+  </p:clrMapOvr>
+  <mc:AlternateContent xmlns:mc="http://schemas.openxmlformats.org/markup-compatibility/2006">
+    <mc:Choice xmlns:p14="http://schemas.microsoft.com/office/powerpoint/2010/main" Requires="p14">
+      <p:transition spd="slow" p14:dur="1400">
+        <p14:doors dir="vert"/>
+      </p:transition>
+    </mc:Choice>
+    <mc:Fallback>
+      <p:transition xmlns:p14="http://schemas.microsoft.com/office/powerpoint/2010/main" spd="slow">
+        <p:fade/>
+      </p:transition>
+    </mc:Fallback>
+  </mc:AlternateContent>
+  <p:timing>
+    <p:tnLst>
+      <p:par>
+        <p:cTn xmlns:p14="http://schemas.microsoft.com/office/powerpoint/2010/main" id="1" dur="indefinite" restart="never" nodeType="tmRoot"/>
+      </p:par>
+    </p:tnLst>
+  </p:timing>
+</p:sld>
+</file>
+
+<file path=ppt/slides/slide3.xml><?xml version="1.0" encoding="utf-8"?>
+<p:sld xmlns:a="http://schemas.openxmlformats.org/drawingml/2006/main" xmlns:r="http://schemas.openxmlformats.org/officeDocument/2006/relationships" xmlns:p="http://schemas.openxmlformats.org/presentationml/2006/main">
+  <p:cSld>
+    <p:spTree>
+      <p:nvGrpSpPr>
+        <p:cNvPr id="1" name=""/>
+        <p:cNvGrpSpPr/>
+        <p:nvPr/>
+      </p:nvGrpSpPr>
+      <p:grpSpPr>
+        <a:xfrm>
+          <a:off x="0" y="0"/>
+          <a:ext cx="0" cy="0"/>
+          <a:chOff x="0" y="0"/>
+          <a:chExt cx="0" cy="0"/>
+        </a:xfrm>
+      </p:grpSpPr>
+      <p:graphicFrame>
+        <p:nvGraphicFramePr>
+          <p:cNvPr id="4" name="Content Placeholder 3"/>
+          <p:cNvGraphicFramePr>
+            <a:graphicFrameLocks noGrp="1"/>
+          </p:cNvGraphicFramePr>
+          <p:nvPr>
+            <p:ph idx="1"/>
+            <p:extLst>
+              <p:ext uri="{D42A27DB-BD31-4B8C-83A1-F6EECF244321}">
+                <p14:modId xmlns:p14="http://schemas.microsoft.com/office/powerpoint/2010/main" val="1609297104"/>
+              </p:ext>
+            </p:extLst>
+          </p:nvPr>
+        </p:nvGraphicFramePr>
+        <p:xfrm>
+          <a:off x="483118" y="1742738"/>
+          <a:ext cx="8229600" cy="2931160"/>
+        </p:xfrm>
+        <a:graphic>
+          <a:graphicData uri="http://schemas.openxmlformats.org/drawingml/2006/table">
+            <a:tbl>
+              <a:tblPr firstRow="1" bandRow="1">
+                <a:tableStyleId>{073A0DAA-6AF3-43AB-8588-CEC1D06C72B9}</a:tableStyleId>
+              </a:tblPr>
+              <a:tblGrid>
+                <a:gridCol w="1979040"/>
+                <a:gridCol w="1562640"/>
+                <a:gridCol w="1562640"/>
+                <a:gridCol w="1562640"/>
+                <a:gridCol w="1562640"/>
+              </a:tblGrid>
+              <a:tr h="370840">
+                <a:tc>
+                  <a:txBody>
+                    <a:bodyPr/>
+                    <a:lstStyle/>
+                    <a:p>
+                      <a:r>
+                        <a:rPr lang="en-US" dirty="0" err="1" smtClean="0"/>
+                        <a:t>Netzwerkstandard</a:t>
+                      </a:r>
+                      <a:endParaRPr lang="en-US" dirty="0"/>
+                    </a:p>
+                  </a:txBody>
+                  <a:tcPr/>
+                </a:tc>
+                <a:tc>
+                  <a:txBody>
+                    <a:bodyPr/>
+                    <a:lstStyle/>
+                    <a:p>
+                      <a:r>
+                        <a:rPr lang="en-US" dirty="0" smtClean="0"/>
+                        <a:t>Laser</a:t>
+                      </a:r>
+                      <a:endParaRPr lang="en-US" dirty="0"/>
+                    </a:p>
+                  </a:txBody>
+                  <a:tcPr/>
+                </a:tc>
+                <a:tc>
+                  <a:txBody>
+                    <a:bodyPr/>
+                    <a:lstStyle/>
+                    <a:p>
+                      <a:r>
+                        <a:rPr lang="en-US" dirty="0" smtClean="0"/>
+                        <a:t>Encoding</a:t>
+                      </a:r>
+                      <a:endParaRPr lang="en-US" dirty="0"/>
+                    </a:p>
+                  </a:txBody>
+                  <a:tcPr/>
+                </a:tc>
+                <a:tc>
+                  <a:txBody>
+                    <a:bodyPr/>
+                    <a:lstStyle/>
+                    <a:p>
+                      <a:r>
+                        <a:rPr lang="en-US" dirty="0" smtClean="0"/>
+                        <a:t>Max</a:t>
+                      </a:r>
+                      <a:r>
+                        <a:rPr lang="en-US" baseline="0" dirty="0" smtClean="0"/>
+                        <a:t>. </a:t>
+                      </a:r>
+                      <a:r>
+                        <a:rPr lang="en-US" baseline="0" dirty="0" err="1" smtClean="0"/>
+                        <a:t>Länge</a:t>
+                      </a:r>
+                      <a:endParaRPr lang="en-US" dirty="0"/>
+                    </a:p>
+                  </a:txBody>
+                  <a:tcPr/>
+                </a:tc>
+                <a:tc>
+                  <a:txBody>
+                    <a:bodyPr/>
+                    <a:lstStyle/>
+                    <a:p>
+                      <a:r>
+                        <a:rPr lang="en-US" dirty="0" err="1" smtClean="0"/>
+                        <a:t>Fibermode</a:t>
+                      </a:r>
+                      <a:endParaRPr lang="en-US" dirty="0"/>
+                    </a:p>
+                  </a:txBody>
+                  <a:tcPr/>
+                </a:tc>
+              </a:tr>
+              <a:tr h="0">
+                <a:tc>
+                  <a:txBody>
+                    <a:bodyPr/>
+                    <a:lstStyle/>
+                    <a:p>
+                      <a:r>
+                        <a:rPr lang="en-US" dirty="0" smtClean="0"/>
+                        <a:t>1000BASE-SX</a:t>
+                      </a:r>
+                      <a:endParaRPr lang="en-US" dirty="0"/>
+                    </a:p>
+                  </a:txBody>
+                  <a:tcPr/>
+                </a:tc>
+                <a:tc>
+                  <a:txBody>
+                    <a:bodyPr/>
+                    <a:lstStyle/>
+                    <a:p>
+                      <a:r>
+                        <a:rPr lang="en-US" dirty="0" smtClean="0"/>
+                        <a:t>850nm</a:t>
+                      </a:r>
+                      <a:endParaRPr lang="en-US" dirty="0"/>
+                    </a:p>
+                  </a:txBody>
+                  <a:tcPr/>
+                </a:tc>
+                <a:tc>
+                  <a:txBody>
+                    <a:bodyPr/>
+                    <a:lstStyle/>
+                    <a:p>
+                      <a:r>
+                        <a:rPr lang="en-US" dirty="0" smtClean="0"/>
+                        <a:t>Extern</a:t>
+                      </a:r>
+                      <a:endParaRPr lang="en-US" dirty="0"/>
+                    </a:p>
+                  </a:txBody>
+                  <a:tcPr/>
+                </a:tc>
+                <a:tc>
+                  <a:txBody>
+                    <a:bodyPr/>
+                    <a:lstStyle/>
+                    <a:p>
+                      <a:r>
+                        <a:rPr lang="en-US" dirty="0" smtClean="0"/>
+                        <a:t>550m</a:t>
+                      </a:r>
+                      <a:endParaRPr lang="en-US" dirty="0"/>
+                    </a:p>
+                  </a:txBody>
+                  <a:tcPr/>
+                </a:tc>
+                <a:tc>
+                  <a:txBody>
+                    <a:bodyPr/>
+                    <a:lstStyle/>
+                    <a:p>
+                      <a:r>
+                        <a:rPr lang="en-US" dirty="0" smtClean="0"/>
+                        <a:t>Single</a:t>
+                      </a:r>
+                      <a:endParaRPr lang="en-US" dirty="0"/>
+                    </a:p>
+                  </a:txBody>
+                  <a:tcPr/>
+                </a:tc>
+              </a:tr>
+              <a:tr h="312783">
+                <a:tc>
+                  <a:txBody>
+                    <a:bodyPr/>
+                    <a:lstStyle/>
+                    <a:p>
+                      <a:r>
+                        <a:rPr lang="en-US" dirty="0" smtClean="0"/>
+                        <a:t>1000BASE</a:t>
+                      </a:r>
+                      <a:r>
+                        <a:rPr lang="en-US" baseline="0" dirty="0" smtClean="0"/>
+                        <a:t>-LX</a:t>
+                      </a:r>
+                      <a:endParaRPr lang="en-US" dirty="0"/>
+                    </a:p>
+                  </a:txBody>
+                  <a:tcPr/>
+                </a:tc>
+                <a:tc>
+                  <a:txBody>
+                    <a:bodyPr/>
+                    <a:lstStyle/>
+                    <a:p>
+                      <a:r>
+                        <a:rPr lang="en-US" dirty="0" smtClean="0"/>
+                        <a:t>1310nm</a:t>
+                      </a:r>
+                      <a:endParaRPr lang="en-US" dirty="0"/>
+                    </a:p>
+                  </a:txBody>
+                  <a:tcPr/>
+                </a:tc>
+                <a:tc>
+                  <a:txBody>
+                    <a:bodyPr/>
+                    <a:lstStyle/>
+                    <a:p>
+                      <a:r>
+                        <a:rPr lang="en-US" dirty="0" smtClean="0"/>
+                        <a:t>Extern</a:t>
+                      </a:r>
+                      <a:endParaRPr lang="en-US" dirty="0"/>
+                    </a:p>
+                  </a:txBody>
+                  <a:tcPr/>
+                </a:tc>
+                <a:tc>
+                  <a:txBody>
+                    <a:bodyPr/>
+                    <a:lstStyle/>
+                    <a:p>
+                      <a:r>
+                        <a:rPr lang="en-US" dirty="0" smtClean="0"/>
+                        <a:t>5km</a:t>
+                      </a:r>
+                      <a:endParaRPr lang="en-US" dirty="0"/>
+                    </a:p>
+                  </a:txBody>
+                  <a:tcPr/>
+                </a:tc>
+                <a:tc>
+                  <a:txBody>
+                    <a:bodyPr/>
+                    <a:lstStyle/>
+                    <a:p>
+                      <a:r>
+                        <a:rPr lang="en-US" dirty="0" smtClean="0"/>
+                        <a:t>Single</a:t>
+                      </a:r>
+                      <a:endParaRPr lang="en-US" dirty="0"/>
+                    </a:p>
+                  </a:txBody>
+                  <a:tcPr/>
+                </a:tc>
+              </a:tr>
+              <a:tr h="259806">
+                <a:tc>
+                  <a:txBody>
+                    <a:bodyPr/>
+                    <a:lstStyle/>
+                    <a:p>
+                      <a:r>
+                        <a:rPr lang="en-US" dirty="0" smtClean="0"/>
+                        <a:t>10GBASE-SR</a:t>
+                      </a:r>
+                      <a:endParaRPr lang="en-US" dirty="0"/>
+                    </a:p>
+                  </a:txBody>
+                  <a:tcPr/>
+                </a:tc>
+                <a:tc>
+                  <a:txBody>
+                    <a:bodyPr/>
+                    <a:lstStyle/>
+                    <a:p>
+                      <a:r>
+                        <a:rPr lang="en-US" dirty="0" smtClean="0"/>
+                        <a:t>850nm</a:t>
+                      </a:r>
+                      <a:endParaRPr lang="en-US" dirty="0"/>
+                    </a:p>
+                  </a:txBody>
+                  <a:tcPr/>
+                </a:tc>
+                <a:tc>
+                  <a:txBody>
+                    <a:bodyPr/>
+                    <a:lstStyle/>
+                    <a:p>
+                      <a:r>
+                        <a:rPr lang="en-US" dirty="0" smtClean="0"/>
+                        <a:t>Scrambled</a:t>
+                      </a:r>
+                      <a:endParaRPr lang="en-US" dirty="0"/>
+                    </a:p>
+                  </a:txBody>
+                  <a:tcPr/>
+                </a:tc>
+                <a:tc>
+                  <a:txBody>
+                    <a:bodyPr/>
+                    <a:lstStyle/>
+                    <a:p>
+                      <a:r>
+                        <a:rPr lang="en-US" dirty="0" smtClean="0"/>
+                        <a:t>300m</a:t>
+                      </a:r>
+                      <a:endParaRPr lang="en-US" dirty="0"/>
+                    </a:p>
+                  </a:txBody>
+                  <a:tcPr/>
+                </a:tc>
+                <a:tc>
+                  <a:txBody>
+                    <a:bodyPr/>
+                    <a:lstStyle/>
+                    <a:p>
+                      <a:r>
+                        <a:rPr lang="en-US" dirty="0" smtClean="0"/>
+                        <a:t>Single/Multi</a:t>
+                      </a:r>
+                      <a:endParaRPr lang="en-US" dirty="0"/>
+                    </a:p>
+                  </a:txBody>
+                  <a:tcPr/>
+                </a:tc>
+              </a:tr>
+              <a:tr h="206829">
+                <a:tc>
+                  <a:txBody>
+                    <a:bodyPr/>
+                    <a:lstStyle/>
+                    <a:p>
+                      <a:r>
+                        <a:rPr lang="en-US" dirty="0" smtClean="0"/>
+                        <a:t>10GBASE-LR</a:t>
+                      </a:r>
+                      <a:endParaRPr lang="en-US" dirty="0"/>
+                    </a:p>
+                  </a:txBody>
+                  <a:tcPr/>
+                </a:tc>
+                <a:tc>
+                  <a:txBody>
+                    <a:bodyPr/>
+                    <a:lstStyle/>
+                    <a:p>
+                      <a:r>
+                        <a:rPr lang="en-US" dirty="0" smtClean="0"/>
+                        <a:t>1310nm</a:t>
+                      </a:r>
+                      <a:endParaRPr lang="en-US" dirty="0"/>
+                    </a:p>
+                  </a:txBody>
+                  <a:tcPr/>
+                </a:tc>
+                <a:tc>
+                  <a:txBody>
+                    <a:bodyPr/>
+                    <a:lstStyle/>
+                    <a:p>
+                      <a:r>
+                        <a:rPr lang="en-US" dirty="0" smtClean="0"/>
+                        <a:t>Scrambled</a:t>
+                      </a:r>
+                      <a:endParaRPr lang="en-US" dirty="0"/>
+                    </a:p>
+                  </a:txBody>
+                  <a:tcPr/>
+                </a:tc>
+                <a:tc>
+                  <a:txBody>
+                    <a:bodyPr/>
+                    <a:lstStyle/>
+                    <a:p>
+                      <a:r>
+                        <a:rPr lang="en-US" dirty="0" smtClean="0"/>
+                        <a:t>10km</a:t>
+                      </a:r>
+                      <a:endParaRPr lang="en-US" dirty="0"/>
+                    </a:p>
+                  </a:txBody>
+                  <a:tcPr/>
+                </a:tc>
+                <a:tc>
+                  <a:txBody>
+                    <a:bodyPr/>
+                    <a:lstStyle/>
+                    <a:p>
+                      <a:r>
+                        <a:rPr lang="en-US" dirty="0" smtClean="0"/>
+                        <a:t>Single/Multi</a:t>
+                      </a:r>
+                      <a:endParaRPr lang="en-US" dirty="0"/>
+                    </a:p>
+                  </a:txBody>
+                  <a:tcPr/>
+                </a:tc>
+              </a:tr>
+              <a:tr h="153851">
+                <a:tc>
+                  <a:txBody>
+                    <a:bodyPr/>
+                    <a:lstStyle/>
+                    <a:p>
+                      <a:r>
+                        <a:rPr lang="en-US" dirty="0" smtClean="0"/>
+                        <a:t>10GBASE-ER</a:t>
+                      </a:r>
+                      <a:endParaRPr lang="en-US" dirty="0"/>
+                    </a:p>
+                  </a:txBody>
+                  <a:tcPr/>
+                </a:tc>
+                <a:tc>
+                  <a:txBody>
+                    <a:bodyPr/>
+                    <a:lstStyle/>
+                    <a:p>
+                      <a:r>
+                        <a:rPr lang="en-US" dirty="0" smtClean="0"/>
+                        <a:t>1550nm</a:t>
+                      </a:r>
+                      <a:endParaRPr lang="en-US" dirty="0"/>
+                    </a:p>
+                  </a:txBody>
+                  <a:tcPr/>
+                </a:tc>
+                <a:tc>
+                  <a:txBody>
+                    <a:bodyPr/>
+                    <a:lstStyle/>
+                    <a:p>
+                      <a:r>
+                        <a:rPr lang="en-US" dirty="0" smtClean="0"/>
+                        <a:t>Scrambled</a:t>
+                      </a:r>
+                      <a:endParaRPr lang="en-US" dirty="0"/>
+                    </a:p>
+                  </a:txBody>
+                  <a:tcPr/>
+                </a:tc>
+                <a:tc>
+                  <a:txBody>
+                    <a:bodyPr/>
+                    <a:lstStyle/>
+                    <a:p>
+                      <a:r>
+                        <a:rPr lang="en-US" dirty="0" smtClean="0"/>
+                        <a:t>40km</a:t>
+                      </a:r>
+                      <a:endParaRPr lang="en-US" dirty="0"/>
+                    </a:p>
+                  </a:txBody>
+                  <a:tcPr/>
+                </a:tc>
+                <a:tc>
+                  <a:txBody>
+                    <a:bodyPr/>
+                    <a:lstStyle/>
+                    <a:p>
+                      <a:r>
+                        <a:rPr lang="en-US" dirty="0" smtClean="0"/>
+                        <a:t>Single</a:t>
+                      </a:r>
+                      <a:endParaRPr lang="en-US" dirty="0"/>
+                    </a:p>
+                  </a:txBody>
+                  <a:tcPr/>
+                </a:tc>
+              </a:tr>
+              <a:tr h="0">
+                <a:tc>
+                  <a:txBody>
+                    <a:bodyPr/>
+                    <a:lstStyle/>
+                    <a:p>
+                      <a:r>
+                        <a:rPr lang="en-US" dirty="0" smtClean="0"/>
+                        <a:t>10GBASE</a:t>
+                      </a:r>
+                      <a:r>
+                        <a:rPr lang="en-US" baseline="0" dirty="0" smtClean="0"/>
+                        <a:t>-LRM</a:t>
+                      </a:r>
+                      <a:endParaRPr lang="en-US" dirty="0"/>
+                    </a:p>
+                  </a:txBody>
+                  <a:tcPr/>
+                </a:tc>
+                <a:tc>
+                  <a:txBody>
+                    <a:bodyPr/>
+                    <a:lstStyle/>
+                    <a:p>
+                      <a:r>
+                        <a:rPr lang="en-US" dirty="0" smtClean="0"/>
+                        <a:t>1310nm</a:t>
+                      </a:r>
+                      <a:endParaRPr lang="en-US" dirty="0"/>
+                    </a:p>
+                  </a:txBody>
+                  <a:tcPr/>
+                </a:tc>
+                <a:tc>
+                  <a:txBody>
+                    <a:bodyPr/>
+                    <a:lstStyle/>
+                    <a:p>
+                      <a:r>
+                        <a:rPr lang="en-US" dirty="0" smtClean="0"/>
+                        <a:t>Scrambled</a:t>
+                      </a:r>
+                      <a:endParaRPr lang="en-US" dirty="0"/>
+                    </a:p>
+                  </a:txBody>
+                  <a:tcPr/>
+                </a:tc>
+                <a:tc>
+                  <a:txBody>
+                    <a:bodyPr/>
+                    <a:lstStyle/>
+                    <a:p>
+                      <a:r>
+                        <a:rPr lang="en-US" dirty="0" smtClean="0"/>
+                        <a:t>220m</a:t>
+                      </a:r>
+                      <a:endParaRPr lang="en-US" dirty="0"/>
+                    </a:p>
+                  </a:txBody>
+                  <a:tcPr/>
+                </a:tc>
+                <a:tc>
+                  <a:txBody>
+                    <a:bodyPr/>
+                    <a:lstStyle/>
+                    <a:p>
+                      <a:r>
+                        <a:rPr lang="en-US" dirty="0" smtClean="0"/>
+                        <a:t>Multi</a:t>
+                      </a:r>
+                      <a:endParaRPr lang="en-US" dirty="0"/>
+                    </a:p>
+                  </a:txBody>
+                  <a:tcPr/>
+                </a:tc>
+              </a:tr>
+              <a:tr h="0">
+                <a:tc>
+                  <a:txBody>
+                    <a:bodyPr/>
+                    <a:lstStyle/>
+                    <a:p>
+                      <a:r>
+                        <a:rPr lang="en-US" dirty="0" smtClean="0"/>
+                        <a:t>10GBASE-LX</a:t>
+                      </a:r>
+                      <a:r>
+                        <a:rPr lang="en-US" baseline="0" dirty="0" smtClean="0"/>
+                        <a:t>4</a:t>
+                      </a:r>
+                      <a:endParaRPr lang="en-US" dirty="0"/>
+                    </a:p>
+                  </a:txBody>
+                  <a:tcPr/>
+                </a:tc>
+                <a:tc>
+                  <a:txBody>
+                    <a:bodyPr/>
+                    <a:lstStyle/>
+                    <a:p>
+                      <a:r>
+                        <a:rPr lang="en-US" dirty="0" smtClean="0"/>
+                        <a:t>1310nm</a:t>
+                      </a:r>
+                      <a:endParaRPr lang="en-US" dirty="0"/>
+                    </a:p>
+                  </a:txBody>
+                  <a:tcPr/>
+                </a:tc>
+                <a:tc>
+                  <a:txBody>
+                    <a:bodyPr/>
+                    <a:lstStyle/>
+                    <a:p>
+                      <a:r>
+                        <a:rPr lang="en-US" dirty="0" smtClean="0"/>
+                        <a:t>Extern</a:t>
+                      </a:r>
+                      <a:endParaRPr lang="en-US" dirty="0"/>
+                    </a:p>
+                  </a:txBody>
+                  <a:tcPr/>
+                </a:tc>
+                <a:tc>
+                  <a:txBody>
+                    <a:bodyPr/>
+                    <a:lstStyle/>
+                    <a:p>
+                      <a:r>
+                        <a:rPr lang="en-US" dirty="0" smtClean="0"/>
+                        <a:t>300m</a:t>
+                      </a:r>
+                      <a:endParaRPr lang="en-US" dirty="0"/>
+                    </a:p>
+                  </a:txBody>
+                  <a:tcPr/>
+                </a:tc>
+                <a:tc>
+                  <a:txBody>
+                    <a:bodyPr/>
+                    <a:lstStyle/>
+                    <a:p>
+                      <a:r>
+                        <a:rPr lang="en-US" dirty="0" smtClean="0"/>
+                        <a:t>Multi</a:t>
+                      </a:r>
+                      <a:endParaRPr lang="en-US" dirty="0"/>
+                    </a:p>
+                  </a:txBody>
+                  <a:tcPr/>
+                </a:tc>
+              </a:tr>
+            </a:tbl>
+          </a:graphicData>
+        </a:graphic>
+      </p:graphicFrame>
+    </p:spTree>
+    <p:extLst>
+      <p:ext uri="{BB962C8B-B14F-4D97-AF65-F5344CB8AC3E}">
+        <p14:creationId xmlns:p14="http://schemas.microsoft.com/office/powerpoint/2010/main" val="1023398551"/>
       </p:ext>
     </p:extLst>
   </p:cSld>

</xml_diff>